<commit_message>
update doc for regulator state machine
</commit_message>
<xml_diff>
--- a/doc/SoftwareDesign/Dashboard/DashboardRequirements.pptx
+++ b/doc/SoftwareDesign/Dashboard/DashboardRequirements.pptx
@@ -5,7 +5,7 @@
     <p:sldMasterId id="2147483648" r:id="rId1"/>
   </p:sldMasterIdLst>
   <p:notesMasterIdLst>
-    <p:notesMasterId r:id="rId10"/>
+    <p:notesMasterId r:id="rId11"/>
   </p:notesMasterIdLst>
   <p:sldIdLst>
     <p:sldId id="259" r:id="rId2"/>
@@ -15,7 +15,8 @@
     <p:sldId id="262" r:id="rId6"/>
     <p:sldId id="256" r:id="rId7"/>
     <p:sldId id="257" r:id="rId8"/>
-    <p:sldId id="258" r:id="rId9"/>
+    <p:sldId id="264" r:id="rId9"/>
+    <p:sldId id="258" r:id="rId10"/>
   </p:sldIdLst>
   <p:sldSz cx="12192000" cy="6858000"/>
   <p:notesSz cx="6858000" cy="9144000"/>
@@ -204,7 +205,7 @@
           <a:p>
             <a:fld id="{D19B47FB-F2C1-48D6-AE82-E7B0FCA59C5B}" type="datetimeFigureOut">
               <a:rPr lang="zh-CN" altLang="en-US" smtClean="0"/>
-              <a:t>2021/10/07</a:t>
+              <a:t>2022/08/14</a:t>
             </a:fld>
             <a:endParaRPr lang="zh-CN" altLang="en-US"/>
           </a:p>
@@ -566,6 +567,101 @@
 </p:notes>
 </file>
 
+<file path=ppt/notesSlides/notesSlide2.xml><?xml version="1.0" encoding="utf-8"?>
+<p:notes xmlns:a="http://schemas.openxmlformats.org/drawingml/2006/main" xmlns:r="http://schemas.openxmlformats.org/officeDocument/2006/relationships" xmlns:p="http://schemas.openxmlformats.org/presentationml/2006/main">
+  <p:cSld>
+    <p:spTree>
+      <p:nvGrpSpPr>
+        <p:cNvPr id="1" name=""/>
+        <p:cNvGrpSpPr/>
+        <p:nvPr/>
+      </p:nvGrpSpPr>
+      <p:grpSpPr>
+        <a:xfrm>
+          <a:off x="0" y="0"/>
+          <a:ext cx="0" cy="0"/>
+          <a:chOff x="0" y="0"/>
+          <a:chExt cx="0" cy="0"/>
+        </a:xfrm>
+      </p:grpSpPr>
+      <p:sp>
+        <p:nvSpPr>
+          <p:cNvPr id="2" name="幻灯片图像占位符 1"/>
+          <p:cNvSpPr>
+            <a:spLocks noGrp="1" noRot="1" noChangeAspect="1"/>
+          </p:cNvSpPr>
+          <p:nvPr>
+            <p:ph type="sldImg"/>
+          </p:nvPr>
+        </p:nvSpPr>
+        <p:spPr/>
+      </p:sp>
+      <p:sp>
+        <p:nvSpPr>
+          <p:cNvPr id="3" name="备注占位符 2"/>
+          <p:cNvSpPr>
+            <a:spLocks noGrp="1"/>
+          </p:cNvSpPr>
+          <p:nvPr>
+            <p:ph type="body" idx="1"/>
+          </p:nvPr>
+        </p:nvSpPr>
+        <p:spPr/>
+        <p:txBody>
+          <a:bodyPr/>
+          <a:lstStyle/>
+          <a:p>
+            <a:r>
+              <a:rPr lang="zh-CN" altLang="en-US" dirty="0"/>
+              <a:t>（</a:t>
+            </a:r>
+            <a:r>
+              <a:rPr lang="en-US" altLang="zh-CN" dirty="0"/>
+              <a:t>optional</a:t>
+            </a:r>
+            <a:r>
+              <a:rPr lang="zh-CN" altLang="en-US" dirty="0"/>
+              <a:t>）可以不做</a:t>
+            </a:r>
+          </a:p>
+        </p:txBody>
+      </p:sp>
+      <p:sp>
+        <p:nvSpPr>
+          <p:cNvPr id="4" name="灯片编号占位符 3"/>
+          <p:cNvSpPr>
+            <a:spLocks noGrp="1"/>
+          </p:cNvSpPr>
+          <p:nvPr>
+            <p:ph type="sldNum" sz="quarter" idx="5"/>
+          </p:nvPr>
+        </p:nvSpPr>
+        <p:spPr/>
+        <p:txBody>
+          <a:bodyPr/>
+          <a:lstStyle/>
+          <a:p>
+            <a:fld id="{4C02A8BD-81E3-43A2-8A1E-4FCD71FC1131}" type="slidenum">
+              <a:rPr lang="zh-CN" altLang="en-US" smtClean="0"/>
+              <a:t>8</a:t>
+            </a:fld>
+            <a:endParaRPr lang="zh-CN" altLang="en-US"/>
+          </a:p>
+        </p:txBody>
+      </p:sp>
+    </p:spTree>
+    <p:extLst>
+      <p:ext uri="{BB962C8B-B14F-4D97-AF65-F5344CB8AC3E}">
+        <p14:creationId xmlns:p14="http://schemas.microsoft.com/office/powerpoint/2010/main" val="3015484621"/>
+      </p:ext>
+    </p:extLst>
+  </p:cSld>
+  <p:clrMapOvr>
+    <a:masterClrMapping/>
+  </p:clrMapOvr>
+</p:notes>
+</file>
+
 <file path=ppt/slideLayouts/slideLayout1.xml><?xml version="1.0" encoding="utf-8"?>
 <p:sldLayout xmlns:a="http://schemas.openxmlformats.org/drawingml/2006/main" xmlns:r="http://schemas.openxmlformats.org/officeDocument/2006/relationships" xmlns:p="http://schemas.openxmlformats.org/presentationml/2006/main" type="title" preserve="1">
   <p:cSld name="标题幻灯片">
@@ -713,7 +809,7 @@
           <a:p>
             <a:fld id="{E8E001D3-436C-43C0-813F-FF95D82683C8}" type="datetimeFigureOut">
               <a:rPr lang="zh-CN" altLang="en-US" smtClean="0"/>
-              <a:t>2021/10/07</a:t>
+              <a:t>2022/08/14</a:t>
             </a:fld>
             <a:endParaRPr lang="zh-CN" altLang="en-US"/>
           </a:p>
@@ -911,7 +1007,7 @@
           <a:p>
             <a:fld id="{E8E001D3-436C-43C0-813F-FF95D82683C8}" type="datetimeFigureOut">
               <a:rPr lang="zh-CN" altLang="en-US" smtClean="0"/>
-              <a:t>2021/10/07</a:t>
+              <a:t>2022/08/14</a:t>
             </a:fld>
             <a:endParaRPr lang="zh-CN" altLang="en-US"/>
           </a:p>
@@ -1119,7 +1215,7 @@
           <a:p>
             <a:fld id="{E8E001D3-436C-43C0-813F-FF95D82683C8}" type="datetimeFigureOut">
               <a:rPr lang="zh-CN" altLang="en-US" smtClean="0"/>
-              <a:t>2021/10/07</a:t>
+              <a:t>2022/08/14</a:t>
             </a:fld>
             <a:endParaRPr lang="zh-CN" altLang="en-US"/>
           </a:p>
@@ -1317,7 +1413,7 @@
           <a:p>
             <a:fld id="{E8E001D3-436C-43C0-813F-FF95D82683C8}" type="datetimeFigureOut">
               <a:rPr lang="zh-CN" altLang="en-US" smtClean="0"/>
-              <a:t>2021/10/07</a:t>
+              <a:t>2022/08/14</a:t>
             </a:fld>
             <a:endParaRPr lang="zh-CN" altLang="en-US"/>
           </a:p>
@@ -1592,7 +1688,7 @@
           <a:p>
             <a:fld id="{E8E001D3-436C-43C0-813F-FF95D82683C8}" type="datetimeFigureOut">
               <a:rPr lang="zh-CN" altLang="en-US" smtClean="0"/>
-              <a:t>2021/10/07</a:t>
+              <a:t>2022/08/14</a:t>
             </a:fld>
             <a:endParaRPr lang="zh-CN" altLang="en-US"/>
           </a:p>
@@ -1857,7 +1953,7 @@
           <a:p>
             <a:fld id="{E8E001D3-436C-43C0-813F-FF95D82683C8}" type="datetimeFigureOut">
               <a:rPr lang="zh-CN" altLang="en-US" smtClean="0"/>
-              <a:t>2021/10/07</a:t>
+              <a:t>2022/08/14</a:t>
             </a:fld>
             <a:endParaRPr lang="zh-CN" altLang="en-US"/>
           </a:p>
@@ -2269,7 +2365,7 @@
           <a:p>
             <a:fld id="{E8E001D3-436C-43C0-813F-FF95D82683C8}" type="datetimeFigureOut">
               <a:rPr lang="zh-CN" altLang="en-US" smtClean="0"/>
-              <a:t>2021/10/07</a:t>
+              <a:t>2022/08/14</a:t>
             </a:fld>
             <a:endParaRPr lang="zh-CN" altLang="en-US"/>
           </a:p>
@@ -2410,7 +2506,7 @@
           <a:p>
             <a:fld id="{E8E001D3-436C-43C0-813F-FF95D82683C8}" type="datetimeFigureOut">
               <a:rPr lang="zh-CN" altLang="en-US" smtClean="0"/>
-              <a:t>2021/10/07</a:t>
+              <a:t>2022/08/14</a:t>
             </a:fld>
             <a:endParaRPr lang="zh-CN" altLang="en-US"/>
           </a:p>
@@ -2523,7 +2619,7 @@
           <a:p>
             <a:fld id="{E8E001D3-436C-43C0-813F-FF95D82683C8}" type="datetimeFigureOut">
               <a:rPr lang="zh-CN" altLang="en-US" smtClean="0"/>
-              <a:t>2021/10/07</a:t>
+              <a:t>2022/08/14</a:t>
             </a:fld>
             <a:endParaRPr lang="zh-CN" altLang="en-US"/>
           </a:p>
@@ -2834,7 +2930,7 @@
           <a:p>
             <a:fld id="{E8E001D3-436C-43C0-813F-FF95D82683C8}" type="datetimeFigureOut">
               <a:rPr lang="zh-CN" altLang="en-US" smtClean="0"/>
-              <a:t>2021/10/07</a:t>
+              <a:t>2022/08/14</a:t>
             </a:fld>
             <a:endParaRPr lang="zh-CN" altLang="en-US"/>
           </a:p>
@@ -3122,7 +3218,7 @@
           <a:p>
             <a:fld id="{E8E001D3-436C-43C0-813F-FF95D82683C8}" type="datetimeFigureOut">
               <a:rPr lang="zh-CN" altLang="en-US" smtClean="0"/>
-              <a:t>2021/10/07</a:t>
+              <a:t>2022/08/14</a:t>
             </a:fld>
             <a:endParaRPr lang="zh-CN" altLang="en-US"/>
           </a:p>
@@ -3363,7 +3459,7 @@
           <a:p>
             <a:fld id="{E8E001D3-436C-43C0-813F-FF95D82683C8}" type="datetimeFigureOut">
               <a:rPr lang="zh-CN" altLang="en-US" smtClean="0"/>
-              <a:t>2021/10/07</a:t>
+              <a:t>2022/08/14</a:t>
             </a:fld>
             <a:endParaRPr lang="zh-CN" altLang="en-US"/>
           </a:p>
@@ -6483,7 +6579,7 @@
         </p:spPr>
         <p:txBody>
           <a:bodyPr>
-            <a:normAutofit fontScale="92500" lnSpcReduction="20000"/>
+            <a:normAutofit lnSpcReduction="10000"/>
           </a:bodyPr>
           <a:lstStyle/>
           <a:p>
@@ -6520,7 +6616,7 @@
           <a:p>
             <a:r>
               <a:rPr lang="zh-CN" altLang="en-US" dirty="0"/>
-              <a:t>添加路由模态</a:t>
+              <a:t>可以选择路由模态</a:t>
             </a:r>
             <a:endParaRPr lang="en-US" altLang="zh-CN" dirty="0"/>
           </a:p>
@@ -6546,7 +6642,7 @@
             <a:pPr lvl="2"/>
             <a:r>
               <a:rPr lang="zh-CN" altLang="en-US" dirty="0"/>
-              <a:t>高带宽，低时延，高可用，尽力而为</a:t>
+              <a:t>高带宽，低时延，高可用，多连接，尽力而为</a:t>
             </a:r>
             <a:endParaRPr lang="en-US" altLang="zh-CN" dirty="0"/>
           </a:p>
@@ -6554,12 +6650,17 @@
             <a:pPr lvl="1"/>
             <a:r>
               <a:rPr lang="zh-CN" altLang="en-US" dirty="0"/>
-              <a:t>添加</a:t>
+              <a:t>选择</a:t>
             </a:r>
             <a:r>
               <a:rPr lang="en-US" altLang="zh-CN" dirty="0"/>
               <a:t>SFC</a:t>
             </a:r>
+            <a:r>
+              <a:rPr lang="zh-CN" altLang="en-US" dirty="0"/>
+              <a:t>信息</a:t>
+            </a:r>
+            <a:endParaRPr lang="en-US" altLang="zh-CN" dirty="0"/>
           </a:p>
           <a:p>
             <a:pPr lvl="2"/>
@@ -6677,36 +6778,7 @@
             </a:r>
           </a:p>
           <a:p>
-            <a:pPr lvl="2"/>
-            <a:r>
-              <a:rPr lang="zh-CN" altLang="en-US" dirty="0"/>
-              <a:t>添加</a:t>
-            </a:r>
-            <a:r>
-              <a:rPr lang="en-US" altLang="zh-CN" dirty="0"/>
-              <a:t>SFCI</a:t>
-            </a:r>
-          </a:p>
-          <a:p>
-            <a:pPr lvl="2"/>
-            <a:r>
-              <a:rPr lang="zh-CN" altLang="en-US" dirty="0"/>
-              <a:t>删除</a:t>
-            </a:r>
-            <a:r>
-              <a:rPr lang="en-US" altLang="zh-CN" dirty="0"/>
-              <a:t>SFCI</a:t>
-            </a:r>
-          </a:p>
-          <a:p>
-            <a:r>
-              <a:rPr lang="zh-CN" altLang="en-US" dirty="0"/>
-              <a:t>删除</a:t>
-            </a:r>
-            <a:r>
-              <a:rPr lang="en-US" altLang="zh-CN" dirty="0"/>
-              <a:t>SFC</a:t>
-            </a:r>
+            <a:endParaRPr lang="en-US" altLang="zh-CN" dirty="0"/>
           </a:p>
         </p:txBody>
       </p:sp>
@@ -6724,6 +6796,269 @@
 </file>
 
 <file path=ppt/slides/slide8.xml><?xml version="1.0" encoding="utf-8"?>
+<p:sld xmlns:a="http://schemas.openxmlformats.org/drawingml/2006/main" xmlns:r="http://schemas.openxmlformats.org/officeDocument/2006/relationships" xmlns:p="http://schemas.openxmlformats.org/presentationml/2006/main">
+  <p:cSld>
+    <p:spTree>
+      <p:nvGrpSpPr>
+        <p:cNvPr id="1" name=""/>
+        <p:cNvGrpSpPr/>
+        <p:nvPr/>
+      </p:nvGrpSpPr>
+      <p:grpSpPr>
+        <a:xfrm>
+          <a:off x="0" y="0"/>
+          <a:ext cx="0" cy="0"/>
+          <a:chOff x="0" y="0"/>
+          <a:chExt cx="0" cy="0"/>
+        </a:xfrm>
+      </p:grpSpPr>
+      <p:sp>
+        <p:nvSpPr>
+          <p:cNvPr id="2" name="标题 1">
+            <a:extLst>
+              <a:ext uri="{FF2B5EF4-FFF2-40B4-BE49-F238E27FC236}">
+                <a16:creationId xmlns:a16="http://schemas.microsoft.com/office/drawing/2014/main" id="{0B3E2F81-61D4-4E09-A985-20857CB99E72}"/>
+              </a:ext>
+            </a:extLst>
+          </p:cNvPr>
+          <p:cNvSpPr>
+            <a:spLocks noGrp="1"/>
+          </p:cNvSpPr>
+          <p:nvPr>
+            <p:ph type="title"/>
+          </p:nvPr>
+        </p:nvSpPr>
+        <p:spPr/>
+        <p:txBody>
+          <a:bodyPr/>
+          <a:lstStyle/>
+          <a:p>
+            <a:r>
+              <a:rPr lang="zh-CN" altLang="en-US" dirty="0"/>
+              <a:t>需求</a:t>
+            </a:r>
+          </a:p>
+        </p:txBody>
+      </p:sp>
+      <p:sp>
+        <p:nvSpPr>
+          <p:cNvPr id="3" name="内容占位符 2">
+            <a:extLst>
+              <a:ext uri="{FF2B5EF4-FFF2-40B4-BE49-F238E27FC236}">
+                <a16:creationId xmlns:a16="http://schemas.microsoft.com/office/drawing/2014/main" id="{4ACD6E95-8715-4831-9222-7D6EC13020DB}"/>
+              </a:ext>
+            </a:extLst>
+          </p:cNvPr>
+          <p:cNvSpPr>
+            <a:spLocks noGrp="1"/>
+          </p:cNvSpPr>
+          <p:nvPr>
+            <p:ph idx="1"/>
+          </p:nvPr>
+        </p:nvSpPr>
+        <p:spPr>
+          <a:xfrm>
+            <a:off x="414867" y="1825624"/>
+            <a:ext cx="11540065" cy="4890861"/>
+          </a:xfrm>
+        </p:spPr>
+        <p:txBody>
+          <a:bodyPr>
+            <a:normAutofit/>
+          </a:bodyPr>
+          <a:lstStyle/>
+          <a:p>
+            <a:r>
+              <a:rPr lang="zh-CN" altLang="en-US" dirty="0"/>
+              <a:t>添加</a:t>
+            </a:r>
+            <a:r>
+              <a:rPr lang="en-US" altLang="zh-CN" dirty="0"/>
+              <a:t>SFCI</a:t>
+            </a:r>
+          </a:p>
+          <a:p>
+            <a:pPr lvl="1"/>
+            <a:r>
+              <a:rPr lang="zh-CN" altLang="en-US" dirty="0"/>
+              <a:t>只有</a:t>
+            </a:r>
+            <a:r>
+              <a:rPr lang="en-US" altLang="zh-CN" dirty="0"/>
+              <a:t>SFC</a:t>
+            </a:r>
+            <a:r>
+              <a:rPr lang="zh-CN" altLang="en-US" dirty="0"/>
+              <a:t>在手动扩容模式下，且</a:t>
+            </a:r>
+            <a:r>
+              <a:rPr lang="en-US" altLang="zh-CN" dirty="0"/>
+              <a:t>SFC</a:t>
+            </a:r>
+            <a:r>
+              <a:rPr lang="zh-CN" altLang="en-US" dirty="0"/>
+              <a:t>状态为</a:t>
+            </a:r>
+            <a:r>
+              <a:rPr lang="en-US" altLang="zh-CN" b="0" dirty="0">
+                <a:solidFill>
+                  <a:srgbClr val="4FC1FF"/>
+                </a:solidFill>
+                <a:effectLst/>
+                <a:latin typeface="Consolas" panose="020B0609020204030204" pitchFamily="49" charset="0"/>
+              </a:rPr>
+              <a:t>STATE_ACTIVE/STATE_MANUAL</a:t>
+            </a:r>
+            <a:endParaRPr lang="en-US" altLang="zh-CN" dirty="0"/>
+          </a:p>
+          <a:p>
+            <a:pPr lvl="2"/>
+            <a:r>
+              <a:rPr lang="en-US" altLang="zh-CN" dirty="0"/>
+              <a:t>dashboard</a:t>
+            </a:r>
+            <a:r>
+              <a:rPr lang="zh-CN" altLang="en-US" dirty="0"/>
+              <a:t>可以发送</a:t>
+            </a:r>
+            <a:r>
+              <a:rPr lang="en-US" altLang="zh-CN" dirty="0"/>
+              <a:t>ADD_SFCI_REQUEST</a:t>
+            </a:r>
+          </a:p>
+          <a:p>
+            <a:r>
+              <a:rPr lang="zh-CN" altLang="en-US" dirty="0"/>
+              <a:t>删除</a:t>
+            </a:r>
+            <a:r>
+              <a:rPr lang="en-US" altLang="zh-CN" dirty="0"/>
+              <a:t>SFCI</a:t>
+            </a:r>
+          </a:p>
+          <a:p>
+            <a:pPr lvl="1"/>
+            <a:r>
+              <a:rPr lang="zh-CN" altLang="en-US" dirty="0"/>
+              <a:t>只有</a:t>
+            </a:r>
+            <a:r>
+              <a:rPr lang="en-US" altLang="zh-CN" dirty="0"/>
+              <a:t>SFC</a:t>
+            </a:r>
+            <a:r>
+              <a:rPr lang="zh-CN" altLang="en-US" dirty="0"/>
+              <a:t>在手动扩容模式下，且</a:t>
+            </a:r>
+            <a:r>
+              <a:rPr lang="en-US" altLang="zh-CN" dirty="0"/>
+              <a:t>SFC</a:t>
+            </a:r>
+            <a:r>
+              <a:rPr lang="zh-CN" altLang="en-US" dirty="0"/>
+              <a:t>状态为</a:t>
+            </a:r>
+            <a:r>
+              <a:rPr lang="en-US" altLang="zh-CN" b="0" dirty="0">
+                <a:solidFill>
+                  <a:srgbClr val="4FC1FF"/>
+                </a:solidFill>
+                <a:effectLst/>
+                <a:latin typeface="Consolas" panose="020B0609020204030204" pitchFamily="49" charset="0"/>
+              </a:rPr>
+              <a:t>STATE_ACTIVE/STATE_MANUAL</a:t>
+            </a:r>
+            <a:endParaRPr lang="en-US" altLang="zh-CN" dirty="0"/>
+          </a:p>
+          <a:p>
+            <a:pPr lvl="2"/>
+            <a:r>
+              <a:rPr lang="en-US" altLang="zh-CN" dirty="0"/>
+              <a:t>dashboard</a:t>
+            </a:r>
+            <a:r>
+              <a:rPr lang="zh-CN" altLang="en-US" dirty="0"/>
+              <a:t>可以发送</a:t>
+            </a:r>
+            <a:r>
+              <a:rPr lang="en-US" altLang="zh-CN" dirty="0"/>
+              <a:t>DEL_SFCI_REQUEST</a:t>
+            </a:r>
+          </a:p>
+          <a:p>
+            <a:r>
+              <a:rPr lang="zh-CN" altLang="en-US" dirty="0"/>
+              <a:t>删除</a:t>
+            </a:r>
+            <a:r>
+              <a:rPr lang="en-US" altLang="zh-CN" dirty="0"/>
+              <a:t>SFC</a:t>
+            </a:r>
+          </a:p>
+          <a:p>
+            <a:pPr lvl="1"/>
+            <a:r>
+              <a:rPr lang="zh-CN" altLang="en-US" dirty="0"/>
+              <a:t>程序自动将</a:t>
+            </a:r>
+            <a:r>
+              <a:rPr lang="en-US" altLang="zh-CN" dirty="0"/>
+              <a:t>SFC</a:t>
+            </a:r>
+            <a:r>
+              <a:rPr lang="zh-CN" altLang="en-US" dirty="0"/>
+              <a:t>的状态改成手动扩缩容</a:t>
+            </a:r>
+            <a:endParaRPr lang="en-US" altLang="zh-CN" dirty="0"/>
+          </a:p>
+          <a:p>
+            <a:pPr lvl="2"/>
+            <a:r>
+              <a:rPr lang="zh-CN" altLang="en-US" dirty="0"/>
+              <a:t>前提先判断</a:t>
+            </a:r>
+            <a:r>
+              <a:rPr lang="en-US" altLang="zh-CN" dirty="0"/>
+              <a:t>SFC</a:t>
+            </a:r>
+            <a:r>
+              <a:rPr lang="zh-CN" altLang="en-US" dirty="0"/>
+              <a:t>的状态是否为</a:t>
+            </a:r>
+            <a:r>
+              <a:rPr lang="en-US" altLang="zh-CN" b="0" dirty="0">
+                <a:solidFill>
+                  <a:srgbClr val="4FC1FF"/>
+                </a:solidFill>
+                <a:effectLst/>
+                <a:latin typeface="Consolas" panose="020B0609020204030204" pitchFamily="49" charset="0"/>
+              </a:rPr>
+              <a:t>STATE_ACTIVE</a:t>
+            </a:r>
+            <a:endParaRPr lang="en-US" altLang="zh-CN" b="0" dirty="0">
+              <a:solidFill>
+                <a:srgbClr val="D4D4D4"/>
+              </a:solidFill>
+              <a:effectLst/>
+              <a:latin typeface="Consolas" panose="020B0609020204030204" pitchFamily="49" charset="0"/>
+            </a:endParaRPr>
+          </a:p>
+        </p:txBody>
+      </p:sp>
+    </p:spTree>
+    <p:extLst>
+      <p:ext uri="{BB962C8B-B14F-4D97-AF65-F5344CB8AC3E}">
+        <p14:creationId xmlns:p14="http://schemas.microsoft.com/office/powerpoint/2010/main" val="173875851"/>
+      </p:ext>
+    </p:extLst>
+  </p:cSld>
+  <p:clrMapOvr>
+    <a:masterClrMapping/>
+  </p:clrMapOvr>
+</p:sld>
+</file>
+
+<file path=ppt/slides/slide9.xml><?xml version="1.0" encoding="utf-8"?>
 <p:sld xmlns:a="http://schemas.openxmlformats.org/drawingml/2006/main" xmlns:r="http://schemas.openxmlformats.org/officeDocument/2006/relationships" xmlns:p="http://schemas.openxmlformats.org/presentationml/2006/main">
   <p:cSld>
     <p:spTree>

</xml_diff>